<commit_message>
Create link to download
</commit_message>
<xml_diff>
--- a/PowerPointWebAddIn1/bin/Debug/Presentation1.pptx
+++ b/PowerPointWebAddIn1/bin/Debug/Presentation1.pptx
@@ -2,10 +2,10 @@
 <file path=ppt/presentation.xml><?xml version="1.0" encoding="utf-8"?>
 <p:presentation xmlns:a="http://schemas.openxmlformats.org/drawingml/2006/main" xmlns:r="http://schemas.openxmlformats.org/officeDocument/2006/relationships" xmlns:p="http://schemas.openxmlformats.org/presentationml/2006/main" saveSubsetFonts="1">
   <p:sldMasterIdLst>
-    <p:sldMasterId id="2147483648" r:id="Rb6175b2589fd4ffd"/>
+    <p:sldMasterId id="2147483648" r:id="R3285cb4c09a0443a"/>
   </p:sldMasterIdLst>
   <p:sldIdLst>
-    <p:sldId id="256" r:id="R5ebbcb5ccbf147f5"/>
+    <p:sldId id="256" r:id="R0fe3520819534858"/>
   </p:sldIdLst>
   <p:sldSz cx="12192000" cy="6858000"/>
   <p:notesSz cx="6858000" cy="9144000"/>
@@ -2652,17 +2652,17 @@
   </p:cSld>
   <p:clrMap bg1="lt1" tx1="dk1" bg2="lt2" tx2="dk2" accent1="accent1" accent2="accent2" accent3="accent3" accent4="accent4" accent5="accent5" accent6="accent6" hlink="hlink" folHlink="folHlink"/>
   <p:sldLayoutIdLst>
-    <p:sldLayoutId id="2147483649" r:id="R47f9d4f43ebc476f"/>
-    <p:sldLayoutId id="2147483650" r:id="Rea5b244ce42446d2"/>
-    <p:sldLayoutId id="2147483651" r:id="Rf9d80b49dc37453b"/>
-    <p:sldLayoutId id="2147483652" r:id="R7be75d991d3d400e"/>
-    <p:sldLayoutId id="2147483653" r:id="R00ec1afc93ba4151"/>
-    <p:sldLayoutId id="2147483654" r:id="Rf7e8b765914e4dc8"/>
-    <p:sldLayoutId id="2147483655" r:id="Rd59da9ecc3a547bc"/>
-    <p:sldLayoutId id="2147483656" r:id="Rc607c1010247431a"/>
-    <p:sldLayoutId id="2147483657" r:id="R775a9a3804934182"/>
-    <p:sldLayoutId id="2147483658" r:id="Re9e92e06a68a4fda"/>
-    <p:sldLayoutId id="2147483659" r:id="Rb4cdc637a44a4039"/>
+    <p:sldLayoutId id="2147483649" r:id="R02d0efe7333949b3"/>
+    <p:sldLayoutId id="2147483650" r:id="Ra182c0e33da54c73"/>
+    <p:sldLayoutId id="2147483651" r:id="R3f4d81f2f1384016"/>
+    <p:sldLayoutId id="2147483652" r:id="Rfc0012bfd3da41f3"/>
+    <p:sldLayoutId id="2147483653" r:id="R36e1ecccee224e74"/>
+    <p:sldLayoutId id="2147483654" r:id="R074e005950194f3d"/>
+    <p:sldLayoutId id="2147483655" r:id="Re4a4391c2db04331"/>
+    <p:sldLayoutId id="2147483656" r:id="Rb6d14c4f4e5b40f6"/>
+    <p:sldLayoutId id="2147483657" r:id="R0096473ad246473f"/>
+    <p:sldLayoutId id="2147483658" r:id="R6aadf45cba534597"/>
+    <p:sldLayoutId id="2147483659" r:id="Ra084506bcbed4ffc"/>
   </p:sldLayoutIdLst>
   <p:txStyles>
     <p:titleStyle>
@@ -3279,13 +3279,13 @@
 <file path=ppt/webextensions/taskpanes.xml><?xml version="1.0" encoding="utf-8"?>
 <wetp:taskpanes xmlns:r="http://schemas.openxmlformats.org/officeDocument/2006/relationships" xmlns:wetp="http://schemas.microsoft.com/office/webextensions/taskpanes/2010/11">
   <wetp:taskpane dockstate="" visibility="1" width="350" row="1">
-    <wetp:webextensionref xmlns:r="http://schemas.openxmlformats.org/officeDocument/2006/relationships" r:id="R6356cff2a66c48c3"/>
+    <wetp:webextensionref xmlns:r="http://schemas.openxmlformats.org/officeDocument/2006/relationships" r:id="Rdc4dff0faa184c97"/>
   </wetp:taskpane>
 </wetp:taskpanes>
 </file>
 
 <file path=ppt/webextensions/webextension.xml><?xml version="1.0" encoding="utf-8"?>
-<we:webextension xmlns:we="http://schemas.microsoft.com/office/webextensions/webextension/2010/11" id="{6531a586-2aae-4109-8cd6-d5e4f80d4c46}">
+<we:webextension xmlns:we="http://schemas.microsoft.com/office/webextensions/webextension/2010/11" id="{c3776f61-ab5c-4586-800d-62b7d1a2263d}">
   <we:reference id="02c0ff99-6023-4e93-8c90-98bc3f89694d" version="1.0.0.0" store="developer" storeType="Registry"/>
   <we:alternateReferences/>
   <we:properties/>

</xml_diff>